<commit_message>
Presentation and Controller Update
Fixed a few slides on the presentation. The Controllers were auto displaying menus after user inputs and not giving space to read displayed info. Added functionality to prompt the user to press enter after actions, so the displayed actions would be visible before the next menu displayed.
</commit_message>
<xml_diff>
--- a/Presentation materials/Project 0 Presentation.pptx
+++ b/Presentation materials/Project 0 Presentation.pptx
@@ -5,10 +5,10 @@
     <p:sldMasterId id="2147483648" r:id="rId4"/>
   </p:sldMasterIdLst>
   <p:notesMasterIdLst>
-    <p:notesMasterId r:id="rId13"/>
+    <p:notesMasterId r:id="rId14"/>
   </p:notesMasterIdLst>
   <p:handoutMasterIdLst>
-    <p:handoutMasterId r:id="rId14"/>
+    <p:handoutMasterId r:id="rId15"/>
   </p:handoutMasterIdLst>
   <p:sldIdLst>
     <p:sldId id="314" r:id="rId5"/>
@@ -16,9 +16,10 @@
     <p:sldId id="334" r:id="rId7"/>
     <p:sldId id="343" r:id="rId8"/>
     <p:sldId id="339" r:id="rId9"/>
-    <p:sldId id="341" r:id="rId10"/>
+    <p:sldId id="344" r:id="rId10"/>
     <p:sldId id="322" r:id="rId11"/>
-    <p:sldId id="331" r:id="rId12"/>
+    <p:sldId id="341" r:id="rId12"/>
+    <p:sldId id="331" r:id="rId13"/>
   </p:sldIdLst>
   <p:sldSz cx="12192000" cy="6858000"/>
   <p:notesSz cx="6858000" cy="9144000"/>
@@ -1266,7 +1267,13 @@
   <p:cSld>
     <p:spTree>
       <p:nvGrpSpPr>
-        <p:cNvPr id="1" name=""/>
+        <p:cNvPr id="1" name="">
+          <a:extLst>
+            <a:ext uri="{FF2B5EF4-FFF2-40B4-BE49-F238E27FC236}">
+              <a16:creationId xmlns:a16="http://schemas.microsoft.com/office/drawing/2014/main" id="{972AA71B-F609-3D85-812B-F1EA56F319C9}"/>
+            </a:ext>
+          </a:extLst>
+        </p:cNvPr>
         <p:cNvGrpSpPr/>
         <p:nvPr/>
       </p:nvGrpSpPr>
@@ -1280,7 +1287,13 @@
       </p:grpSpPr>
       <p:sp>
         <p:nvSpPr>
-          <p:cNvPr id="2" name="Slide Image Placeholder 1"/>
+          <p:cNvPr id="2" name="Slide Image Placeholder 1">
+            <a:extLst>
+              <a:ext uri="{FF2B5EF4-FFF2-40B4-BE49-F238E27FC236}">
+                <a16:creationId xmlns:a16="http://schemas.microsoft.com/office/drawing/2014/main" id="{92221FE3-CC58-59CA-BCA4-16FD3AC1DDDE}"/>
+              </a:ext>
+            </a:extLst>
+          </p:cNvPr>
           <p:cNvSpPr>
             <a:spLocks noGrp="1" noRot="1" noChangeAspect="1"/>
           </p:cNvSpPr>
@@ -1292,7 +1305,13 @@
       </p:sp>
       <p:sp>
         <p:nvSpPr>
-          <p:cNvPr id="3" name="Notes Placeholder 2"/>
+          <p:cNvPr id="3" name="Notes Placeholder 2">
+            <a:extLst>
+              <a:ext uri="{FF2B5EF4-FFF2-40B4-BE49-F238E27FC236}">
+                <a16:creationId xmlns:a16="http://schemas.microsoft.com/office/drawing/2014/main" id="{27F95A1D-6537-4E98-22D6-7ED9319A48EB}"/>
+              </a:ext>
+            </a:extLst>
+          </p:cNvPr>
           <p:cNvSpPr>
             <a:spLocks noGrp="1"/>
           </p:cNvSpPr>
@@ -1305,16 +1324,59 @@
           <a:bodyPr/>
           <a:lstStyle/>
           <a:p>
+            <a:pPr marL="0" marR="0" lvl="0" indent="0" algn="l" defTabSz="914400" rtl="0" eaLnBrk="1" fontAlgn="auto" latinLnBrk="0" hangingPunct="1">
+              <a:lnSpc>
+                <a:spcPct val="100000"/>
+              </a:lnSpc>
+              <a:spcBef>
+                <a:spcPts val="0"/>
+              </a:spcBef>
+              <a:spcAft>
+                <a:spcPts val="0"/>
+              </a:spcAft>
+              <a:buClrTx/>
+              <a:buSzTx/>
+              <a:buFontTx/>
+              <a:buNone/>
+              <a:tabLst/>
+              <a:defRPr/>
+            </a:pPr>
             <a:r>
               <a:rPr lang="en-US" dirty="0"/>
               <a:t>This is the basic implementation of the 3-tier structure in Java with some of the package details hidden.</a:t>
+            </a:r>
+            <a:br>
+              <a:rPr lang="en-US" dirty="0"/>
+            </a:br>
+            <a:br>
+              <a:rPr lang="en-US" dirty="0"/>
+            </a:br>
+            <a:r>
+              <a:rPr lang="en-US" dirty="0"/>
+              <a:t>[NEXT]</a:t>
+            </a:r>
+            <a:br>
+              <a:rPr lang="en-US" dirty="0"/>
+            </a:br>
+            <a:br>
+              <a:rPr lang="en-US" dirty="0"/>
+            </a:br>
+            <a:r>
+              <a:rPr lang="en-US" dirty="0"/>
+              <a:t>And this is the full project structure on display.</a:t>
             </a:r>
           </a:p>
         </p:txBody>
       </p:sp>
       <p:sp>
         <p:nvSpPr>
-          <p:cNvPr id="4" name="Slide Number Placeholder 3"/>
+          <p:cNvPr id="4" name="Slide Number Placeholder 3">
+            <a:extLst>
+              <a:ext uri="{FF2B5EF4-FFF2-40B4-BE49-F238E27FC236}">
+                <a16:creationId xmlns:a16="http://schemas.microsoft.com/office/drawing/2014/main" id="{90A91384-D326-F13F-431E-8DA5AA120E04}"/>
+              </a:ext>
+            </a:extLst>
+          </p:cNvPr>
           <p:cNvSpPr>
             <a:spLocks noGrp="1"/>
           </p:cNvSpPr>
@@ -1338,7 +1400,7 @@
     </p:spTree>
     <p:extLst>
       <p:ext uri="{BB962C8B-B14F-4D97-AF65-F5344CB8AC3E}">
-        <p14:creationId xmlns:p14="http://schemas.microsoft.com/office/powerpoint/2010/main" val="321455229"/>
+        <p14:creationId xmlns:p14="http://schemas.microsoft.com/office/powerpoint/2010/main" val="3612408126"/>
       </p:ext>
     </p:extLst>
   </p:cSld>
@@ -1392,7 +1454,10 @@
           <a:bodyPr/>
           <a:lstStyle/>
           <a:p>
-            <a:endParaRPr lang="en-US" dirty="0"/>
+            <a:r>
+              <a:rPr lang="en-US" dirty="0"/>
+              <a:t>[MOVE TO IDE]</a:t>
+            </a:r>
           </a:p>
         </p:txBody>
       </p:sp>
@@ -1478,7 +1543,7 @@
           <a:p>
             <a:r>
               <a:rPr lang="en-US" dirty="0"/>
-              <a:t>https://github.com/XenonReaction/Project_0-Library_Management_System</a:t>
+              <a:t>Any questions?</a:t>
             </a:r>
           </a:p>
         </p:txBody>
@@ -1501,6 +1566,93 @@
             <a:fld id="{96E09883-B744-4FDD-8623-D69A66650022}" type="slidenum">
               <a:rPr lang="en-US" smtClean="0"/>
               <a:t>8</a:t>
+            </a:fld>
+            <a:endParaRPr lang="en-US" dirty="0"/>
+          </a:p>
+        </p:txBody>
+      </p:sp>
+    </p:spTree>
+    <p:extLst>
+      <p:ext uri="{BB962C8B-B14F-4D97-AF65-F5344CB8AC3E}">
+        <p14:creationId xmlns:p14="http://schemas.microsoft.com/office/powerpoint/2010/main" val="321455229"/>
+      </p:ext>
+    </p:extLst>
+  </p:cSld>
+  <p:clrMapOvr>
+    <a:masterClrMapping/>
+  </p:clrMapOvr>
+</p:notes>
+</file>
+
+<file path=ppt/notesSlides/notesSlide9.xml><?xml version="1.0" encoding="utf-8"?>
+<p:notes xmlns:a="http://schemas.openxmlformats.org/drawingml/2006/main" xmlns:r="http://schemas.openxmlformats.org/officeDocument/2006/relationships" xmlns:p="http://schemas.openxmlformats.org/presentationml/2006/main">
+  <p:cSld>
+    <p:spTree>
+      <p:nvGrpSpPr>
+        <p:cNvPr id="1" name=""/>
+        <p:cNvGrpSpPr/>
+        <p:nvPr/>
+      </p:nvGrpSpPr>
+      <p:grpSpPr>
+        <a:xfrm>
+          <a:off x="0" y="0"/>
+          <a:ext cx="0" cy="0"/>
+          <a:chOff x="0" y="0"/>
+          <a:chExt cx="0" cy="0"/>
+        </a:xfrm>
+      </p:grpSpPr>
+      <p:sp>
+        <p:nvSpPr>
+          <p:cNvPr id="2" name="Slide Image Placeholder 1"/>
+          <p:cNvSpPr>
+            <a:spLocks noGrp="1" noRot="1" noChangeAspect="1"/>
+          </p:cNvSpPr>
+          <p:nvPr>
+            <p:ph type="sldImg"/>
+          </p:nvPr>
+        </p:nvSpPr>
+        <p:spPr/>
+      </p:sp>
+      <p:sp>
+        <p:nvSpPr>
+          <p:cNvPr id="3" name="Notes Placeholder 2"/>
+          <p:cNvSpPr>
+            <a:spLocks noGrp="1"/>
+          </p:cNvSpPr>
+          <p:nvPr>
+            <p:ph type="body" idx="1"/>
+          </p:nvPr>
+        </p:nvSpPr>
+        <p:spPr/>
+        <p:txBody>
+          <a:bodyPr/>
+          <a:lstStyle/>
+          <a:p>
+            <a:r>
+              <a:rPr lang="en-US" dirty="0"/>
+              <a:t>https://github.com/XenonReaction/Project_0-Library_Management_System</a:t>
+            </a:r>
+          </a:p>
+        </p:txBody>
+      </p:sp>
+      <p:sp>
+        <p:nvSpPr>
+          <p:cNvPr id="4" name="Slide Number Placeholder 3"/>
+          <p:cNvSpPr>
+            <a:spLocks noGrp="1"/>
+          </p:cNvSpPr>
+          <p:nvPr>
+            <p:ph type="sldNum" sz="quarter" idx="5"/>
+          </p:nvPr>
+        </p:nvSpPr>
+        <p:spPr/>
+        <p:txBody>
+          <a:bodyPr/>
+          <a:lstStyle/>
+          <a:p>
+            <a:fld id="{96E09883-B744-4FDD-8623-D69A66650022}" type="slidenum">
+              <a:rPr lang="en-US" smtClean="0"/>
+              <a:t>9</a:t>
             </a:fld>
             <a:endParaRPr lang="en-US" dirty="0"/>
           </a:p>
@@ -8789,7 +8941,7 @@
             </a:pPr>
             <a:r>
               <a:rPr lang="en-US" sz="3200" dirty="0"/>
-              <a:t>Console Based</a:t>
+              <a:t>Written in Java </a:t>
             </a:r>
           </a:p>
           <a:p>
@@ -8798,9 +8950,10 @@
               <a:buChar char="•"/>
             </a:pPr>
             <a:r>
-              <a:rPr lang="en-US" sz="3200" dirty="0"/>
-              <a:t>Written in Java</a:t>
-            </a:r>
+              <a:rPr lang="en-US" sz="3200"/>
+              <a:t>Console Based</a:t>
+            </a:r>
+            <a:endParaRPr lang="en-US" sz="3200" dirty="0"/>
           </a:p>
           <a:p>
             <a:pPr marL="342900" indent="-342900">
@@ -10385,7 +10538,13 @@
   <p:cSld>
     <p:spTree>
       <p:nvGrpSpPr>
-        <p:cNvPr id="1" name=""/>
+        <p:cNvPr id="1" name="">
+          <a:extLst>
+            <a:ext uri="{FF2B5EF4-FFF2-40B4-BE49-F238E27FC236}">
+              <a16:creationId xmlns:a16="http://schemas.microsoft.com/office/drawing/2014/main" id="{18EA910D-C396-C1F4-9F14-06E94368D397}"/>
+            </a:ext>
+          </a:extLst>
+        </p:cNvPr>
         <p:cNvGrpSpPr/>
         <p:nvPr/>
       </p:nvGrpSpPr>
@@ -10399,7 +10558,7 @@
       </p:grpSpPr>
       <p:sp>
         <p:nvSpPr>
-          <p:cNvPr id="2" name="Title 1">
+          <p:cNvPr id="5" name="Title 1">
             <a:extLst>
               <a:ext uri="{FF2B5EF4-FFF2-40B4-BE49-F238E27FC236}">
                 <a16:creationId xmlns:a16="http://schemas.microsoft.com/office/drawing/2014/main" id="{5509B1ED-4D78-65EC-0579-DA9E41D7C42C}"/>
@@ -10430,37 +10589,12 @@
           </a:p>
         </p:txBody>
       </p:sp>
-      <p:sp>
-        <p:nvSpPr>
-          <p:cNvPr id="4" name="Picture Placeholder 3">
-            <a:extLst>
-              <a:ext uri="{FF2B5EF4-FFF2-40B4-BE49-F238E27FC236}">
-                <a16:creationId xmlns:a16="http://schemas.microsoft.com/office/drawing/2014/main" id="{15A680F5-A62D-12FA-2EE5-D24827F55C7B}"/>
-              </a:ext>
-            </a:extLst>
-          </p:cNvPr>
-          <p:cNvSpPr>
-            <a:spLocks noGrp="1"/>
-          </p:cNvSpPr>
-          <p:nvPr>
-            <p:ph type="pic" sz="quarter" idx="15"/>
-          </p:nvPr>
-        </p:nvSpPr>
-        <p:spPr/>
-        <p:txBody>
-          <a:bodyPr/>
-          <a:lstStyle/>
-          <a:p>
-            <a:endParaRPr lang="en-US"/>
-          </a:p>
-        </p:txBody>
-      </p:sp>
       <p:pic>
         <p:nvPicPr>
-          <p:cNvPr id="10" name="Picture 9" descr="A screenshot of a computer program&#10;&#10;AI-generated content may be incorrect.">
+          <p:cNvPr id="9" name="Picture 8" descr="A screenshot of a computer&#10;&#10;AI-generated content may be incorrect.">
             <a:extLst>
               <a:ext uri="{FF2B5EF4-FFF2-40B4-BE49-F238E27FC236}">
-                <a16:creationId xmlns:a16="http://schemas.microsoft.com/office/drawing/2014/main" id="{F2790A50-780A-33E3-7B69-26CBD81307D5}"/>
+                <a16:creationId xmlns:a16="http://schemas.microsoft.com/office/drawing/2014/main" id="{6513A98A-4FF5-4A82-5B68-2CA3E6D6E1A0}"/>
               </a:ext>
             </a:extLst>
           </p:cNvPr>
@@ -10477,8 +10611,94 @@
         </p:blipFill>
         <p:spPr>
           <a:xfrm>
-            <a:off x="1589963" y="1411570"/>
-            <a:ext cx="3673158" cy="5052498"/>
+            <a:off x="2982551" y="1601847"/>
+            <a:ext cx="4648740" cy="4712132"/>
+          </a:xfrm>
+          <a:prstGeom prst="roundRect">
+            <a:avLst>
+              <a:gd name="adj" fmla="val 8594"/>
+            </a:avLst>
+          </a:prstGeom>
+          <a:solidFill>
+            <a:srgbClr val="FFFFFF">
+              <a:shade val="85000"/>
+            </a:srgbClr>
+          </a:solidFill>
+          <a:ln>
+            <a:noFill/>
+          </a:ln>
+          <a:effectLst>
+            <a:reflection blurRad="12700" stA="38000" endPos="28000" dist="5000" dir="5400000" sy="-100000" algn="bl" rotWithShape="0"/>
+          </a:effectLst>
+        </p:spPr>
+      </p:pic>
+      <p:pic>
+        <p:nvPicPr>
+          <p:cNvPr id="11" name="Picture 10" descr="A screenshot of a computer&#10;&#10;AI-generated content may be incorrect.">
+            <a:extLst>
+              <a:ext uri="{FF2B5EF4-FFF2-40B4-BE49-F238E27FC236}">
+                <a16:creationId xmlns:a16="http://schemas.microsoft.com/office/drawing/2014/main" id="{C83BE83A-1979-11B9-F797-E5177E656CBA}"/>
+              </a:ext>
+            </a:extLst>
+          </p:cNvPr>
+          <p:cNvPicPr>
+            <a:picLocks noChangeAspect="1"/>
+          </p:cNvPicPr>
+          <p:nvPr/>
+        </p:nvPicPr>
+        <p:blipFill>
+          <a:blip r:embed="rId4"/>
+          <a:stretch>
+            <a:fillRect/>
+          </a:stretch>
+        </p:blipFill>
+        <p:spPr>
+          <a:xfrm>
+            <a:off x="811185" y="1424043"/>
+            <a:ext cx="4961050" cy="5067739"/>
+          </a:xfrm>
+          <a:prstGeom prst="roundRect">
+            <a:avLst>
+              <a:gd name="adj" fmla="val 8594"/>
+            </a:avLst>
+          </a:prstGeom>
+          <a:solidFill>
+            <a:srgbClr val="FFFFFF">
+              <a:shade val="85000"/>
+            </a:srgbClr>
+          </a:solidFill>
+          <a:ln>
+            <a:noFill/>
+          </a:ln>
+          <a:effectLst>
+            <a:reflection blurRad="12700" stA="38000" endPos="28000" dist="5000" dir="5400000" sy="-100000" algn="bl" rotWithShape="0"/>
+          </a:effectLst>
+        </p:spPr>
+      </p:pic>
+      <p:pic>
+        <p:nvPicPr>
+          <p:cNvPr id="13" name="Picture 12" descr="A screenshot of a computer&#10;&#10;AI-generated content may be incorrect.">
+            <a:extLst>
+              <a:ext uri="{FF2B5EF4-FFF2-40B4-BE49-F238E27FC236}">
+                <a16:creationId xmlns:a16="http://schemas.microsoft.com/office/drawing/2014/main" id="{EF47E95A-1D49-5E2B-7196-E2C412149486}"/>
+              </a:ext>
+            </a:extLst>
+          </p:cNvPr>
+          <p:cNvPicPr>
+            <a:picLocks noChangeAspect="1"/>
+          </p:cNvPicPr>
+          <p:nvPr/>
+        </p:nvPicPr>
+        <p:blipFill>
+          <a:blip r:embed="rId5"/>
+          <a:stretch>
+            <a:fillRect/>
+          </a:stretch>
+        </p:blipFill>
+        <p:spPr>
+          <a:xfrm>
+            <a:off x="6514437" y="544021"/>
+            <a:ext cx="5075360" cy="6172735"/>
           </a:xfrm>
           <a:prstGeom prst="roundRect">
             <a:avLst>
@@ -10501,13 +10721,166 @@
     </p:spTree>
     <p:extLst>
       <p:ext uri="{BB962C8B-B14F-4D97-AF65-F5344CB8AC3E}">
-        <p14:creationId xmlns:p14="http://schemas.microsoft.com/office/powerpoint/2010/main" val="866310751"/>
+        <p14:creationId xmlns:p14="http://schemas.microsoft.com/office/powerpoint/2010/main" val="1865458497"/>
       </p:ext>
     </p:extLst>
   </p:cSld>
   <p:clrMapOvr>
     <a:masterClrMapping/>
   </p:clrMapOvr>
+  <p:timing>
+    <p:tnLst>
+      <p:par>
+        <p:cTn id="1" dur="indefinite" restart="never" nodeType="tmRoot">
+          <p:childTnLst>
+            <p:seq concurrent="1" nextAc="seek">
+              <p:cTn id="2" dur="indefinite" nodeType="mainSeq">
+                <p:childTnLst>
+                  <p:par>
+                    <p:cTn id="3" fill="hold">
+                      <p:stCondLst>
+                        <p:cond delay="indefinite"/>
+                      </p:stCondLst>
+                      <p:childTnLst>
+                        <p:par>
+                          <p:cTn id="4" fill="hold">
+                            <p:stCondLst>
+                              <p:cond delay="0"/>
+                            </p:stCondLst>
+                            <p:childTnLst>
+                              <p:par>
+                                <p:cTn id="5" presetID="10" presetClass="entr" presetSubtype="0" fill="hold" nodeType="clickEffect">
+                                  <p:stCondLst>
+                                    <p:cond delay="0"/>
+                                  </p:stCondLst>
+                                  <p:childTnLst>
+                                    <p:set>
+                                      <p:cBhvr>
+                                        <p:cTn id="6" dur="1" fill="hold">
+                                          <p:stCondLst>
+                                            <p:cond delay="0"/>
+                                          </p:stCondLst>
+                                        </p:cTn>
+                                        <p:tgtEl>
+                                          <p:spTgt spid="11"/>
+                                        </p:tgtEl>
+                                        <p:attrNameLst>
+                                          <p:attrName>style.visibility</p:attrName>
+                                        </p:attrNameLst>
+                                      </p:cBhvr>
+                                      <p:to>
+                                        <p:strVal val="visible"/>
+                                      </p:to>
+                                    </p:set>
+                                    <p:animEffect transition="in" filter="fade">
+                                      <p:cBhvr>
+                                        <p:cTn id="7" dur="500"/>
+                                        <p:tgtEl>
+                                          <p:spTgt spid="11"/>
+                                        </p:tgtEl>
+                                      </p:cBhvr>
+                                    </p:animEffect>
+                                  </p:childTnLst>
+                                </p:cTn>
+                              </p:par>
+                              <p:par>
+                                <p:cTn id="8" presetID="10" presetClass="entr" presetSubtype="0" fill="hold" nodeType="withEffect">
+                                  <p:stCondLst>
+                                    <p:cond delay="0"/>
+                                  </p:stCondLst>
+                                  <p:childTnLst>
+                                    <p:set>
+                                      <p:cBhvr>
+                                        <p:cTn id="9" dur="1" fill="hold">
+                                          <p:stCondLst>
+                                            <p:cond delay="0"/>
+                                          </p:stCondLst>
+                                        </p:cTn>
+                                        <p:tgtEl>
+                                          <p:spTgt spid="13"/>
+                                        </p:tgtEl>
+                                        <p:attrNameLst>
+                                          <p:attrName>style.visibility</p:attrName>
+                                        </p:attrNameLst>
+                                      </p:cBhvr>
+                                      <p:to>
+                                        <p:strVal val="visible"/>
+                                      </p:to>
+                                    </p:set>
+                                    <p:animEffect transition="in" filter="fade">
+                                      <p:cBhvr>
+                                        <p:cTn id="10" dur="500"/>
+                                        <p:tgtEl>
+                                          <p:spTgt spid="13"/>
+                                        </p:tgtEl>
+                                      </p:cBhvr>
+                                    </p:animEffect>
+                                  </p:childTnLst>
+                                </p:cTn>
+                              </p:par>
+                              <p:par>
+                                <p:cTn id="11" presetID="10" presetClass="exit" presetSubtype="0" fill="hold" nodeType="withEffect">
+                                  <p:stCondLst>
+                                    <p:cond delay="0"/>
+                                  </p:stCondLst>
+                                  <p:childTnLst>
+                                    <p:animEffect transition="out" filter="fade">
+                                      <p:cBhvr>
+                                        <p:cTn id="12" dur="500"/>
+                                        <p:tgtEl>
+                                          <p:spTgt spid="9"/>
+                                        </p:tgtEl>
+                                      </p:cBhvr>
+                                    </p:animEffect>
+                                    <p:set>
+                                      <p:cBhvr>
+                                        <p:cTn id="13" dur="1" fill="hold">
+                                          <p:stCondLst>
+                                            <p:cond delay="499"/>
+                                          </p:stCondLst>
+                                        </p:cTn>
+                                        <p:tgtEl>
+                                          <p:spTgt spid="9"/>
+                                        </p:tgtEl>
+                                        <p:attrNameLst>
+                                          <p:attrName>style.visibility</p:attrName>
+                                        </p:attrNameLst>
+                                      </p:cBhvr>
+                                      <p:to>
+                                        <p:strVal val="hidden"/>
+                                      </p:to>
+                                    </p:set>
+                                  </p:childTnLst>
+                                </p:cTn>
+                              </p:par>
+                            </p:childTnLst>
+                          </p:cTn>
+                        </p:par>
+                      </p:childTnLst>
+                    </p:cTn>
+                  </p:par>
+                </p:childTnLst>
+              </p:cTn>
+              <p:prevCondLst>
+                <p:cond evt="onPrev" delay="0">
+                  <p:tgtEl>
+                    <p:sldTgt/>
+                  </p:tgtEl>
+                </p:cond>
+              </p:prevCondLst>
+              <p:nextCondLst>
+                <p:cond evt="onNext" delay="0">
+                  <p:tgtEl>
+                    <p:sldTgt/>
+                  </p:tgtEl>
+                </p:cond>
+              </p:nextCondLst>
+            </p:seq>
+          </p:childTnLst>
+        </p:cTn>
+      </p:par>
+    </p:tnLst>
+  </p:timing>
 </p:sld>
 </file>
 
@@ -10575,6 +10948,116 @@
 </file>
 
 <file path=ppt/slides/slide8.xml><?xml version="1.0" encoding="utf-8"?>
+<p:sld xmlns:a="http://schemas.openxmlformats.org/drawingml/2006/main" xmlns:r="http://schemas.openxmlformats.org/officeDocument/2006/relationships" xmlns:p="http://schemas.openxmlformats.org/presentationml/2006/main">
+  <p:cSld>
+    <p:spTree>
+      <p:nvGrpSpPr>
+        <p:cNvPr id="1" name=""/>
+        <p:cNvGrpSpPr/>
+        <p:nvPr/>
+      </p:nvGrpSpPr>
+      <p:grpSpPr>
+        <a:xfrm>
+          <a:off x="0" y="0"/>
+          <a:ext cx="0" cy="0"/>
+          <a:chOff x="0" y="0"/>
+          <a:chExt cx="0" cy="0"/>
+        </a:xfrm>
+      </p:grpSpPr>
+      <p:sp>
+        <p:nvSpPr>
+          <p:cNvPr id="4" name="Picture Placeholder 3">
+            <a:extLst>
+              <a:ext uri="{FF2B5EF4-FFF2-40B4-BE49-F238E27FC236}">
+                <a16:creationId xmlns:a16="http://schemas.microsoft.com/office/drawing/2014/main" id="{15A680F5-A62D-12FA-2EE5-D24827F55C7B}"/>
+              </a:ext>
+            </a:extLst>
+          </p:cNvPr>
+          <p:cNvSpPr>
+            <a:spLocks noGrp="1"/>
+          </p:cNvSpPr>
+          <p:nvPr>
+            <p:ph type="pic" sz="quarter" idx="15"/>
+          </p:nvPr>
+        </p:nvSpPr>
+        <p:spPr/>
+        <p:txBody>
+          <a:bodyPr/>
+          <a:lstStyle/>
+          <a:p>
+            <a:endParaRPr lang="en-US"/>
+          </a:p>
+        </p:txBody>
+      </p:sp>
+      <p:sp>
+        <p:nvSpPr>
+          <p:cNvPr id="3" name="Title 3">
+            <a:extLst>
+              <a:ext uri="{FF2B5EF4-FFF2-40B4-BE49-F238E27FC236}">
+                <a16:creationId xmlns:a16="http://schemas.microsoft.com/office/drawing/2014/main" id="{BB42601B-B8F3-CD8D-2DC9-3F73872D37D4}"/>
+              </a:ext>
+            </a:extLst>
+          </p:cNvPr>
+          <p:cNvSpPr txBox="1">
+            <a:spLocks/>
+          </p:cNvSpPr>
+          <p:nvPr/>
+        </p:nvSpPr>
+        <p:spPr>
+          <a:xfrm>
+            <a:off x="858062" y="2170373"/>
+            <a:ext cx="8180412" cy="1828800"/>
+          </a:xfrm>
+          <a:prstGeom prst="rect">
+            <a:avLst/>
+          </a:prstGeom>
+        </p:spPr>
+        <p:txBody>
+          <a:bodyPr vert="horz" lIns="0" tIns="0" rIns="0" bIns="0" rtlCol="0" anchor="b">
+            <a:noAutofit/>
+          </a:bodyPr>
+          <a:lstStyle>
+            <a:lvl1pPr algn="l" defTabSz="914400" rtl="0" eaLnBrk="1" latinLnBrk="0" hangingPunct="1">
+              <a:lnSpc>
+                <a:spcPct val="90000"/>
+              </a:lnSpc>
+              <a:spcBef>
+                <a:spcPct val="0"/>
+              </a:spcBef>
+              <a:buNone/>
+              <a:defRPr sz="5400" b="1" i="0" kern="1200" spc="100" baseline="0">
+                <a:solidFill>
+                  <a:schemeClr val="bg1"/>
+                </a:solidFill>
+                <a:latin typeface="+mj-lt"/>
+                <a:ea typeface="+mj-ea"/>
+                <a:cs typeface="Arial Black" panose="020B0604020202020204" pitchFamily="34" charset="0"/>
+              </a:defRPr>
+            </a:lvl1pPr>
+          </a:lstStyle>
+          <a:p>
+            <a:r>
+              <a:rPr lang="en-US" sz="6600"/>
+              <a:t>Q &amp; A</a:t>
+            </a:r>
+            <a:endParaRPr lang="en-US" sz="6600" dirty="0"/>
+          </a:p>
+        </p:txBody>
+      </p:sp>
+    </p:spTree>
+    <p:extLst>
+      <p:ext uri="{BB962C8B-B14F-4D97-AF65-F5344CB8AC3E}">
+        <p14:creationId xmlns:p14="http://schemas.microsoft.com/office/powerpoint/2010/main" val="866310751"/>
+      </p:ext>
+    </p:extLst>
+  </p:cSld>
+  <p:clrMapOvr>
+    <a:masterClrMapping/>
+  </p:clrMapOvr>
+</p:sld>
+</file>
+
+<file path=ppt/slides/slide9.xml><?xml version="1.0" encoding="utf-8"?>
 <p:sld xmlns:a="http://schemas.openxmlformats.org/drawingml/2006/main" xmlns:r="http://schemas.openxmlformats.org/officeDocument/2006/relationships" xmlns:p="http://schemas.openxmlformats.org/presentationml/2006/main">
   <p:cSld>
     <p:spTree>
@@ -11503,6 +11986,15 @@
 </file>
 
 <file path=customXml/item1.xml><?xml version="1.0" encoding="utf-8"?>
+<?mso-contentType ?>
+<FormTemplates xmlns="http://schemas.microsoft.com/sharepoint/v3/contenttype/forms">
+  <Display>DocumentLibraryForm</Display>
+  <Edit>DocumentLibraryForm</Edit>
+  <New>DocumentLibraryForm</New>
+</FormTemplates>
+</file>
+
+<file path=customXml/item2.xml><?xml version="1.0" encoding="utf-8"?>
 <p:properties xmlns:p="http://schemas.microsoft.com/office/2006/metadata/properties" xmlns:xsi="http://www.w3.org/2001/XMLSchema-instance" xmlns:pc="http://schemas.microsoft.com/office/infopath/2007/PartnerControls">
   <documentManagement>
     <_ip_UnifiedCompliancePolicyUIAction xmlns="http://schemas.microsoft.com/sharepoint/v3" xsi:nil="true"/>
@@ -11520,15 +12012,6 @@
     <MediaServiceKeyPoints xmlns="71af3243-3dd4-4a8d-8c0d-dd76da1f02a5" xsi:nil="true"/>
   </documentManagement>
 </p:properties>
-</file>
-
-<file path=customXml/item2.xml><?xml version="1.0" encoding="utf-8"?>
-<?mso-contentType ?>
-<FormTemplates xmlns="http://schemas.microsoft.com/sharepoint/v3/contenttype/forms">
-  <Display>DocumentLibraryForm</Display>
-  <Edit>DocumentLibraryForm</Edit>
-  <New>DocumentLibraryForm</New>
-</FormTemplates>
 </file>
 
 <file path=customXml/item3.xml><?xml version="1.0" encoding="utf-8"?>
@@ -11844,6 +12327,14 @@
 </file>
 
 <file path=customXml/itemProps1.xml><?xml version="1.0" encoding="utf-8"?>
+<ds:datastoreItem xmlns:ds="http://schemas.openxmlformats.org/officeDocument/2006/customXml" ds:itemID="{85B6D968-3BA5-45CA-AFA4-01F84FB04FAA}">
+  <ds:schemaRefs>
+    <ds:schemaRef ds:uri="http://schemas.microsoft.com/sharepoint/v3/contenttype/forms"/>
+  </ds:schemaRefs>
+</ds:datastoreItem>
+</file>
+
+<file path=customXml/itemProps2.xml><?xml version="1.0" encoding="utf-8"?>
 <ds:datastoreItem xmlns:ds="http://schemas.openxmlformats.org/officeDocument/2006/customXml" ds:itemID="{677C52C5-6F65-4D42-B855-A3283C55581A}">
   <ds:schemaRefs>
     <ds:schemaRef ds:uri="http://schemas.microsoft.com/office/2006/metadata/properties"/>
@@ -11851,14 +12342,6 @@
     <ds:schemaRef ds:uri="http://schemas.microsoft.com/sharepoint/v3"/>
     <ds:schemaRef ds:uri="71af3243-3dd4-4a8d-8c0d-dd76da1f02a5"/>
     <ds:schemaRef ds:uri="230e9df3-be65-4c73-a93b-d1236ebd677e"/>
-  </ds:schemaRefs>
-</ds:datastoreItem>
-</file>
-
-<file path=customXml/itemProps2.xml><?xml version="1.0" encoding="utf-8"?>
-<ds:datastoreItem xmlns:ds="http://schemas.openxmlformats.org/officeDocument/2006/customXml" ds:itemID="{85B6D968-3BA5-45CA-AFA4-01F84FB04FAA}">
-  <ds:schemaRefs>
-    <ds:schemaRef ds:uri="http://schemas.microsoft.com/sharepoint/v3/contenttype/forms"/>
   </ds:schemaRefs>
 </ds:datastoreItem>
 </file>

</xml_diff>